<commit_message>
commiting final version of presentation
</commit_message>
<xml_diff>
--- a/README Images/Solo Project Presentation.pptx
+++ b/README Images/Solo Project Presentation.pptx
@@ -13,9 +13,12 @@
     <p:sldId id="266" r:id="rId7"/>
     <p:sldId id="261" r:id="rId8"/>
     <p:sldId id="262" r:id="rId9"/>
-    <p:sldId id="263" r:id="rId10"/>
-    <p:sldId id="265" r:id="rId11"/>
-    <p:sldId id="264" r:id="rId12"/>
+    <p:sldId id="267" r:id="rId10"/>
+    <p:sldId id="263" r:id="rId11"/>
+    <p:sldId id="265" r:id="rId12"/>
+    <p:sldId id="264" r:id="rId13"/>
+    <p:sldId id="268" r:id="rId14"/>
+    <p:sldId id="269" r:id="rId15"/>
   </p:sldIdLst>
   <p:sldSz cx="12192000" cy="6858000"/>
   <p:notesSz cx="6858000" cy="9144000"/>
@@ -164,7 +167,7 @@
           </a:lstStyle>
           <a:p>
             <a:r>
-              <a:rPr lang="en-US" smtClean="0"/>
+              <a:rPr lang="en-US"/>
               <a:t>Click to edit Master title style</a:t>
             </a:r>
             <a:endParaRPr lang="en-US" dirty="0"/>
@@ -284,7 +287,7 @@
           </a:lstStyle>
           <a:p>
             <a:r>
-              <a:rPr lang="en-US" smtClean="0"/>
+              <a:rPr lang="en-US"/>
               <a:t>Click to edit Master subtitle style</a:t>
             </a:r>
             <a:endParaRPr lang="en-US" dirty="0"/>
@@ -413,7 +416,7 @@
           </a:lstStyle>
           <a:p>
             <a:r>
-              <a:rPr lang="en-US" smtClean="0"/>
+              <a:rPr lang="en-US"/>
               <a:t>Click to edit Master title style</a:t>
             </a:r>
             <a:endParaRPr lang="en-US" dirty="0"/>
@@ -492,7 +495,7 @@
           </a:lstStyle>
           <a:p>
             <a:r>
-              <a:rPr lang="en-US" smtClean="0"/>
+              <a:rPr lang="en-US"/>
               <a:t>Click icon to add picture</a:t>
             </a:r>
             <a:endParaRPr lang="en-US" dirty="0"/>
@@ -560,7 +563,7 @@
           <a:p>
             <a:pPr lvl="0"/>
             <a:r>
-              <a:rPr lang="en-US" smtClean="0"/>
+              <a:rPr lang="en-US"/>
               <a:t>Edit Master text styles</a:t>
             </a:r>
           </a:p>
@@ -686,7 +689,7 @@
           </a:lstStyle>
           <a:p>
             <a:r>
-              <a:rPr lang="en-US" smtClean="0"/>
+              <a:rPr lang="en-US"/>
               <a:t>Click to edit Master title style</a:t>
             </a:r>
             <a:endParaRPr lang="en-US" dirty="0"/>
@@ -754,7 +757,7 @@
           <a:p>
             <a:pPr lvl="0"/>
             <a:r>
-              <a:rPr lang="en-US" smtClean="0"/>
+              <a:rPr lang="en-US"/>
               <a:t>Edit Master text styles</a:t>
             </a:r>
           </a:p>
@@ -880,7 +883,7 @@
           </a:lstStyle>
           <a:p>
             <a:r>
-              <a:rPr lang="en-US" smtClean="0"/>
+              <a:rPr lang="en-US"/>
               <a:t>Click to edit Master title style</a:t>
             </a:r>
             <a:endParaRPr lang="en-US" dirty="0"/>
@@ -960,7 +963,7 @@
               <a:buNone/>
             </a:pPr>
             <a:r>
-              <a:rPr lang="en-US" smtClean="0"/>
+              <a:rPr lang="en-US"/>
               <a:t>Edit Master text styles</a:t>
             </a:r>
           </a:p>
@@ -1027,7 +1030,7 @@
           <a:p>
             <a:pPr lvl="0"/>
             <a:r>
-              <a:rPr lang="en-US" smtClean="0"/>
+              <a:rPr lang="en-US"/>
               <a:t>Edit Master text styles</a:t>
             </a:r>
           </a:p>
@@ -1247,7 +1250,7 @@
           </a:lstStyle>
           <a:p>
             <a:r>
-              <a:rPr lang="en-US" smtClean="0"/>
+              <a:rPr lang="en-US"/>
               <a:t>Click to edit Master title style</a:t>
             </a:r>
             <a:endParaRPr lang="en-US" dirty="0"/>
@@ -1368,7 +1371,7 @@
           <a:p>
             <a:pPr lvl="0"/>
             <a:r>
-              <a:rPr lang="en-US" smtClean="0"/>
+              <a:rPr lang="en-US"/>
               <a:t>Edit Master text styles</a:t>
             </a:r>
           </a:p>
@@ -1489,7 +1492,7 @@
           </a:lstStyle>
           <a:p>
             <a:r>
-              <a:rPr lang="en-US" smtClean="0"/>
+              <a:rPr lang="en-US"/>
               <a:t>Click to edit Master title style</a:t>
             </a:r>
             <a:endParaRPr lang="en-US" dirty="0"/>
@@ -1564,7 +1567,7 @@
           <a:p>
             <a:pPr lvl="0"/>
             <a:r>
-              <a:rPr lang="en-US" smtClean="0"/>
+              <a:rPr lang="en-US"/>
               <a:t>Edit Master text styles</a:t>
             </a:r>
           </a:p>
@@ -1631,7 +1634,7 @@
           <a:p>
             <a:pPr lvl="0"/>
             <a:r>
-              <a:rPr lang="en-US" smtClean="0"/>
+              <a:rPr lang="en-US"/>
               <a:t>Edit Master text styles</a:t>
             </a:r>
           </a:p>
@@ -1705,7 +1708,7 @@
           <a:p>
             <a:pPr lvl="0"/>
             <a:r>
-              <a:rPr lang="en-US" smtClean="0"/>
+              <a:rPr lang="en-US"/>
               <a:t>Edit Master text styles</a:t>
             </a:r>
           </a:p>
@@ -1772,7 +1775,7 @@
           <a:p>
             <a:pPr lvl="0"/>
             <a:r>
-              <a:rPr lang="en-US" smtClean="0"/>
+              <a:rPr lang="en-US"/>
               <a:t>Edit Master text styles</a:t>
             </a:r>
           </a:p>
@@ -1846,7 +1849,7 @@
           <a:p>
             <a:pPr lvl="0"/>
             <a:r>
-              <a:rPr lang="en-US" smtClean="0"/>
+              <a:rPr lang="en-US"/>
               <a:t>Edit Master text styles</a:t>
             </a:r>
           </a:p>
@@ -1913,7 +1916,7 @@
           <a:p>
             <a:pPr lvl="0"/>
             <a:r>
-              <a:rPr lang="en-US" smtClean="0"/>
+              <a:rPr lang="en-US"/>
               <a:t>Edit Master text styles</a:t>
             </a:r>
           </a:p>
@@ -2112,7 +2115,7 @@
           </a:lstStyle>
           <a:p>
             <a:r>
-              <a:rPr lang="en-US" smtClean="0"/>
+              <a:rPr lang="en-US"/>
               <a:t>Click to edit Master title style</a:t>
             </a:r>
             <a:endParaRPr lang="en-US" dirty="0"/>
@@ -2187,7 +2190,7 @@
           <a:p>
             <a:pPr lvl="0"/>
             <a:r>
-              <a:rPr lang="en-US" smtClean="0"/>
+              <a:rPr lang="en-US"/>
               <a:t>Edit Master text styles</a:t>
             </a:r>
           </a:p>
@@ -2265,7 +2268,7 @@
           </a:lstStyle>
           <a:p>
             <a:r>
-              <a:rPr lang="en-US" smtClean="0"/>
+              <a:rPr lang="en-US"/>
               <a:t>Click icon to add picture</a:t>
             </a:r>
             <a:endParaRPr lang="en-US" dirty="0"/>
@@ -2333,7 +2336,7 @@
           <a:p>
             <a:pPr lvl="0"/>
             <a:r>
-              <a:rPr lang="en-US" smtClean="0"/>
+              <a:rPr lang="en-US"/>
               <a:t>Edit Master text styles</a:t>
             </a:r>
           </a:p>
@@ -2407,7 +2410,7 @@
           <a:p>
             <a:pPr lvl="0"/>
             <a:r>
-              <a:rPr lang="en-US" smtClean="0"/>
+              <a:rPr lang="en-US"/>
               <a:t>Edit Master text styles</a:t>
             </a:r>
           </a:p>
@@ -2485,7 +2488,7 @@
           </a:lstStyle>
           <a:p>
             <a:r>
-              <a:rPr lang="en-US" smtClean="0"/>
+              <a:rPr lang="en-US"/>
               <a:t>Click icon to add picture</a:t>
             </a:r>
             <a:endParaRPr lang="en-US" dirty="0"/>
@@ -2553,7 +2556,7 @@
           <a:p>
             <a:pPr lvl="0"/>
             <a:r>
-              <a:rPr lang="en-US" smtClean="0"/>
+              <a:rPr lang="en-US"/>
               <a:t>Edit Master text styles</a:t>
             </a:r>
           </a:p>
@@ -2627,7 +2630,7 @@
           <a:p>
             <a:pPr lvl="0"/>
             <a:r>
-              <a:rPr lang="en-US" smtClean="0"/>
+              <a:rPr lang="en-US"/>
               <a:t>Edit Master text styles</a:t>
             </a:r>
           </a:p>
@@ -2705,7 +2708,7 @@
           </a:lstStyle>
           <a:p>
             <a:r>
-              <a:rPr lang="en-US" smtClean="0"/>
+              <a:rPr lang="en-US"/>
               <a:t>Click icon to add picture</a:t>
             </a:r>
             <a:endParaRPr lang="en-US" dirty="0"/>
@@ -2773,7 +2776,7 @@
           <a:p>
             <a:pPr lvl="0"/>
             <a:r>
-              <a:rPr lang="en-US" smtClean="0"/>
+              <a:rPr lang="en-US"/>
               <a:t>Edit Master text styles</a:t>
             </a:r>
           </a:p>
@@ -2968,7 +2971,7 @@
           <a:lstStyle/>
           <a:p>
             <a:r>
-              <a:rPr lang="en-US" smtClean="0"/>
+              <a:rPr lang="en-US"/>
               <a:t>Click to edit Master title style</a:t>
             </a:r>
             <a:endParaRPr lang="en-US" dirty="0"/>
@@ -2992,35 +2995,35 @@
           <a:p>
             <a:pPr lvl="0"/>
             <a:r>
-              <a:rPr lang="en-US" smtClean="0"/>
+              <a:rPr lang="en-US"/>
               <a:t>Edit Master text styles</a:t>
             </a:r>
           </a:p>
           <a:p>
             <a:pPr lvl="1"/>
             <a:r>
-              <a:rPr lang="en-US" smtClean="0"/>
+              <a:rPr lang="en-US"/>
               <a:t>Second level</a:t>
             </a:r>
           </a:p>
           <a:p>
             <a:pPr lvl="2"/>
             <a:r>
-              <a:rPr lang="en-US" smtClean="0"/>
+              <a:rPr lang="en-US"/>
               <a:t>Third level</a:t>
             </a:r>
           </a:p>
           <a:p>
             <a:pPr lvl="3"/>
             <a:r>
-              <a:rPr lang="en-US" smtClean="0"/>
+              <a:rPr lang="en-US"/>
               <a:t>Fourth level</a:t>
             </a:r>
           </a:p>
           <a:p>
             <a:pPr lvl="4"/>
             <a:r>
-              <a:rPr lang="en-US" smtClean="0"/>
+              <a:rPr lang="en-US"/>
               <a:t>Fifth level</a:t>
             </a:r>
             <a:endParaRPr lang="en-US" dirty="0"/>
@@ -3143,7 +3146,7 @@
           <a:lstStyle/>
           <a:p>
             <a:r>
-              <a:rPr lang="en-US" smtClean="0"/>
+              <a:rPr lang="en-US"/>
               <a:t>Click to edit Master title style</a:t>
             </a:r>
             <a:endParaRPr lang="en-US" dirty="0"/>
@@ -3172,35 +3175,35 @@
           <a:p>
             <a:pPr lvl="0"/>
             <a:r>
-              <a:rPr lang="en-US" smtClean="0"/>
+              <a:rPr lang="en-US"/>
               <a:t>Edit Master text styles</a:t>
             </a:r>
           </a:p>
           <a:p>
             <a:pPr lvl="1"/>
             <a:r>
-              <a:rPr lang="en-US" smtClean="0"/>
+              <a:rPr lang="en-US"/>
               <a:t>Second level</a:t>
             </a:r>
           </a:p>
           <a:p>
             <a:pPr lvl="2"/>
             <a:r>
-              <a:rPr lang="en-US" smtClean="0"/>
+              <a:rPr lang="en-US"/>
               <a:t>Third level</a:t>
             </a:r>
           </a:p>
           <a:p>
             <a:pPr lvl="3"/>
             <a:r>
-              <a:rPr lang="en-US" smtClean="0"/>
+              <a:rPr lang="en-US"/>
               <a:t>Fourth level</a:t>
             </a:r>
           </a:p>
           <a:p>
             <a:pPr lvl="4"/>
             <a:r>
-              <a:rPr lang="en-US" smtClean="0"/>
+              <a:rPr lang="en-US"/>
               <a:t>Fifth level</a:t>
             </a:r>
             <a:endParaRPr lang="en-US" dirty="0"/>
@@ -3318,7 +3321,7 @@
           <a:lstStyle/>
           <a:p>
             <a:r>
-              <a:rPr lang="en-US" smtClean="0"/>
+              <a:rPr lang="en-US"/>
               <a:t>Click to edit Master title style</a:t>
             </a:r>
             <a:endParaRPr lang="en-US" dirty="0"/>
@@ -3342,35 +3345,35 @@
           <a:p>
             <a:pPr lvl="0"/>
             <a:r>
-              <a:rPr lang="en-US" smtClean="0"/>
+              <a:rPr lang="en-US"/>
               <a:t>Edit Master text styles</a:t>
             </a:r>
           </a:p>
           <a:p>
             <a:pPr lvl="1"/>
             <a:r>
-              <a:rPr lang="en-US" smtClean="0"/>
+              <a:rPr lang="en-US"/>
               <a:t>Second level</a:t>
             </a:r>
           </a:p>
           <a:p>
             <a:pPr lvl="2"/>
             <a:r>
-              <a:rPr lang="en-US" smtClean="0"/>
+              <a:rPr lang="en-US"/>
               <a:t>Third level</a:t>
             </a:r>
           </a:p>
           <a:p>
             <a:pPr lvl="3"/>
             <a:r>
-              <a:rPr lang="en-US" smtClean="0"/>
+              <a:rPr lang="en-US"/>
               <a:t>Fourth level</a:t>
             </a:r>
           </a:p>
           <a:p>
             <a:pPr lvl="4"/>
             <a:r>
-              <a:rPr lang="en-US" smtClean="0"/>
+              <a:rPr lang="en-US"/>
               <a:t>Fifth level</a:t>
             </a:r>
             <a:endParaRPr lang="en-US" dirty="0"/>
@@ -3497,7 +3500,7 @@
           </a:lstStyle>
           <a:p>
             <a:r>
-              <a:rPr lang="en-US" smtClean="0"/>
+              <a:rPr lang="en-US"/>
               <a:t>Click to edit Master title style</a:t>
             </a:r>
             <a:endParaRPr lang="en-US" dirty="0"/>
@@ -3618,7 +3621,7 @@
           <a:p>
             <a:pPr lvl="0"/>
             <a:r>
-              <a:rPr lang="en-US" smtClean="0"/>
+              <a:rPr lang="en-US"/>
               <a:t>Edit Master text styles</a:t>
             </a:r>
           </a:p>
@@ -3735,7 +3738,7 @@
           <a:lstStyle/>
           <a:p>
             <a:r>
-              <a:rPr lang="en-US" smtClean="0"/>
+              <a:rPr lang="en-US"/>
               <a:t>Click to edit Master title style</a:t>
             </a:r>
             <a:endParaRPr lang="en-US" dirty="0"/>
@@ -3794,35 +3797,35 @@
           <a:p>
             <a:pPr lvl="0"/>
             <a:r>
-              <a:rPr lang="en-US" smtClean="0"/>
+              <a:rPr lang="en-US"/>
               <a:t>Edit Master text styles</a:t>
             </a:r>
           </a:p>
           <a:p>
             <a:pPr lvl="1"/>
             <a:r>
-              <a:rPr lang="en-US" smtClean="0"/>
+              <a:rPr lang="en-US"/>
               <a:t>Second level</a:t>
             </a:r>
           </a:p>
           <a:p>
             <a:pPr lvl="2"/>
             <a:r>
-              <a:rPr lang="en-US" smtClean="0"/>
+              <a:rPr lang="en-US"/>
               <a:t>Third level</a:t>
             </a:r>
           </a:p>
           <a:p>
             <a:pPr lvl="3"/>
             <a:r>
-              <a:rPr lang="en-US" smtClean="0"/>
+              <a:rPr lang="en-US"/>
               <a:t>Fourth level</a:t>
             </a:r>
           </a:p>
           <a:p>
             <a:pPr lvl="4"/>
             <a:r>
-              <a:rPr lang="en-US" smtClean="0"/>
+              <a:rPr lang="en-US"/>
               <a:t>Fifth level</a:t>
             </a:r>
             <a:endParaRPr lang="en-US" dirty="0"/>
@@ -3881,35 +3884,35 @@
           <a:p>
             <a:pPr lvl="0"/>
             <a:r>
-              <a:rPr lang="en-US" smtClean="0"/>
+              <a:rPr lang="en-US"/>
               <a:t>Edit Master text styles</a:t>
             </a:r>
           </a:p>
           <a:p>
             <a:pPr lvl="1"/>
             <a:r>
-              <a:rPr lang="en-US" smtClean="0"/>
+              <a:rPr lang="en-US"/>
               <a:t>Second level</a:t>
             </a:r>
           </a:p>
           <a:p>
             <a:pPr lvl="2"/>
             <a:r>
-              <a:rPr lang="en-US" smtClean="0"/>
+              <a:rPr lang="en-US"/>
               <a:t>Third level</a:t>
             </a:r>
           </a:p>
           <a:p>
             <a:pPr lvl="3"/>
             <a:r>
-              <a:rPr lang="en-US" smtClean="0"/>
+              <a:rPr lang="en-US"/>
               <a:t>Fourth level</a:t>
             </a:r>
           </a:p>
           <a:p>
             <a:pPr lvl="4"/>
             <a:r>
-              <a:rPr lang="en-US" smtClean="0"/>
+              <a:rPr lang="en-US"/>
               <a:t>Fifth level</a:t>
             </a:r>
             <a:endParaRPr lang="en-US" dirty="0"/>
@@ -4031,7 +4034,7 @@
           </a:lstStyle>
           <a:p>
             <a:r>
-              <a:rPr lang="en-US" smtClean="0"/>
+              <a:rPr lang="en-US"/>
               <a:t>Click to edit Master title style</a:t>
             </a:r>
             <a:endParaRPr lang="en-US" dirty="0"/>
@@ -4106,7 +4109,7 @@
           <a:p>
             <a:pPr lvl="0"/>
             <a:r>
-              <a:rPr lang="en-US" smtClean="0"/>
+              <a:rPr lang="en-US"/>
               <a:t>Edit Master text styles</a:t>
             </a:r>
           </a:p>
@@ -4164,35 +4167,35 @@
           <a:p>
             <a:pPr lvl="0"/>
             <a:r>
-              <a:rPr lang="en-US" smtClean="0"/>
+              <a:rPr lang="en-US"/>
               <a:t>Edit Master text styles</a:t>
             </a:r>
           </a:p>
           <a:p>
             <a:pPr lvl="1"/>
             <a:r>
-              <a:rPr lang="en-US" smtClean="0"/>
+              <a:rPr lang="en-US"/>
               <a:t>Second level</a:t>
             </a:r>
           </a:p>
           <a:p>
             <a:pPr lvl="2"/>
             <a:r>
-              <a:rPr lang="en-US" smtClean="0"/>
+              <a:rPr lang="en-US"/>
               <a:t>Third level</a:t>
             </a:r>
           </a:p>
           <a:p>
             <a:pPr lvl="3"/>
             <a:r>
-              <a:rPr lang="en-US" smtClean="0"/>
+              <a:rPr lang="en-US"/>
               <a:t>Fourth level</a:t>
             </a:r>
           </a:p>
           <a:p>
             <a:pPr lvl="4"/>
             <a:r>
-              <a:rPr lang="en-US" smtClean="0"/>
+              <a:rPr lang="en-US"/>
               <a:t>Fifth level</a:t>
             </a:r>
             <a:endParaRPr lang="en-US" dirty="0"/>
@@ -4267,7 +4270,7 @@
           <a:p>
             <a:pPr lvl="0"/>
             <a:r>
-              <a:rPr lang="en-US" smtClean="0"/>
+              <a:rPr lang="en-US"/>
               <a:t>Edit Master text styles</a:t>
             </a:r>
           </a:p>
@@ -4325,35 +4328,35 @@
           <a:p>
             <a:pPr lvl="0"/>
             <a:r>
-              <a:rPr lang="en-US" smtClean="0"/>
+              <a:rPr lang="en-US"/>
               <a:t>Edit Master text styles</a:t>
             </a:r>
           </a:p>
           <a:p>
             <a:pPr lvl="1"/>
             <a:r>
-              <a:rPr lang="en-US" smtClean="0"/>
+              <a:rPr lang="en-US"/>
               <a:t>Second level</a:t>
             </a:r>
           </a:p>
           <a:p>
             <a:pPr lvl="2"/>
             <a:r>
-              <a:rPr lang="en-US" smtClean="0"/>
+              <a:rPr lang="en-US"/>
               <a:t>Third level</a:t>
             </a:r>
           </a:p>
           <a:p>
             <a:pPr lvl="3"/>
             <a:r>
-              <a:rPr lang="en-US" smtClean="0"/>
+              <a:rPr lang="en-US"/>
               <a:t>Fourth level</a:t>
             </a:r>
           </a:p>
           <a:p>
             <a:pPr lvl="4"/>
             <a:r>
-              <a:rPr lang="en-US" smtClean="0"/>
+              <a:rPr lang="en-US"/>
               <a:t>Fifth level</a:t>
             </a:r>
             <a:endParaRPr lang="en-US" dirty="0"/>
@@ -4471,7 +4474,7 @@
           <a:lstStyle/>
           <a:p>
             <a:r>
-              <a:rPr lang="en-US" smtClean="0"/>
+              <a:rPr lang="en-US"/>
               <a:t>Click to edit Master title style</a:t>
             </a:r>
             <a:endParaRPr lang="en-US" dirty="0"/>
@@ -4693,7 +4696,7 @@
           </a:lstStyle>
           <a:p>
             <a:r>
-              <a:rPr lang="en-US" smtClean="0"/>
+              <a:rPr lang="en-US"/>
               <a:t>Click to edit Master title style</a:t>
             </a:r>
             <a:endParaRPr lang="en-US" dirty="0"/>
@@ -4752,35 +4755,35 @@
           <a:p>
             <a:pPr lvl="0"/>
             <a:r>
-              <a:rPr lang="en-US" smtClean="0"/>
+              <a:rPr lang="en-US"/>
               <a:t>Edit Master text styles</a:t>
             </a:r>
           </a:p>
           <a:p>
             <a:pPr lvl="1"/>
             <a:r>
-              <a:rPr lang="en-US" smtClean="0"/>
+              <a:rPr lang="en-US"/>
               <a:t>Second level</a:t>
             </a:r>
           </a:p>
           <a:p>
             <a:pPr lvl="2"/>
             <a:r>
-              <a:rPr lang="en-US" smtClean="0"/>
+              <a:rPr lang="en-US"/>
               <a:t>Third level</a:t>
             </a:r>
           </a:p>
           <a:p>
             <a:pPr lvl="3"/>
             <a:r>
-              <a:rPr lang="en-US" smtClean="0"/>
+              <a:rPr lang="en-US"/>
               <a:t>Fourth level</a:t>
             </a:r>
           </a:p>
           <a:p>
             <a:pPr lvl="4"/>
             <a:r>
-              <a:rPr lang="en-US" smtClean="0"/>
+              <a:rPr lang="en-US"/>
               <a:t>Fifth level</a:t>
             </a:r>
             <a:endParaRPr lang="en-US" dirty="0"/>
@@ -4846,7 +4849,7 @@
           <a:p>
             <a:pPr lvl="0"/>
             <a:r>
-              <a:rPr lang="en-US" smtClean="0"/>
+              <a:rPr lang="en-US"/>
               <a:t>Edit Master text styles</a:t>
             </a:r>
           </a:p>
@@ -4974,7 +4977,7 @@
           </a:lstStyle>
           <a:p>
             <a:r>
-              <a:rPr lang="en-US" smtClean="0"/>
+              <a:rPr lang="en-US"/>
               <a:t>Click to edit Master title style</a:t>
             </a:r>
             <a:endParaRPr lang="en-US" dirty="0"/>
@@ -5053,7 +5056,7 @@
           </a:lstStyle>
           <a:p>
             <a:r>
-              <a:rPr lang="en-US" smtClean="0"/>
+              <a:rPr lang="en-US"/>
               <a:t>Click icon to add picture</a:t>
             </a:r>
             <a:endParaRPr lang="en-US" dirty="0"/>
@@ -5121,7 +5124,7 @@
           <a:p>
             <a:pPr lvl="0"/>
             <a:r>
-              <a:rPr lang="en-US" smtClean="0"/>
+              <a:rPr lang="en-US"/>
               <a:t>Edit Master text styles</a:t>
             </a:r>
           </a:p>
@@ -5468,7 +5471,7 @@
           <a:lstStyle/>
           <a:p>
             <a:r>
-              <a:rPr lang="en-US" smtClean="0"/>
+              <a:rPr lang="en-US"/>
               <a:t>Click to edit Master title style</a:t>
             </a:r>
             <a:endParaRPr lang="en-US" dirty="0"/>
@@ -5502,35 +5505,35 @@
           <a:p>
             <a:pPr lvl="0"/>
             <a:r>
-              <a:rPr lang="en-US" smtClean="0"/>
+              <a:rPr lang="en-US"/>
               <a:t>Edit Master text styles</a:t>
             </a:r>
           </a:p>
           <a:p>
             <a:pPr lvl="1"/>
             <a:r>
-              <a:rPr lang="en-US" smtClean="0"/>
+              <a:rPr lang="en-US"/>
               <a:t>Second level</a:t>
             </a:r>
           </a:p>
           <a:p>
             <a:pPr lvl="2"/>
             <a:r>
-              <a:rPr lang="en-US" smtClean="0"/>
+              <a:rPr lang="en-US"/>
               <a:t>Third level</a:t>
             </a:r>
           </a:p>
           <a:p>
             <a:pPr lvl="3"/>
             <a:r>
-              <a:rPr lang="en-US" smtClean="0"/>
+              <a:rPr lang="en-US"/>
               <a:t>Fourth level</a:t>
             </a:r>
           </a:p>
           <a:p>
             <a:pPr lvl="4"/>
             <a:r>
-              <a:rPr lang="en-US" smtClean="0"/>
+              <a:rPr lang="en-US"/>
               <a:t>Fifth level</a:t>
             </a:r>
             <a:endParaRPr lang="en-US" dirty="0"/>
@@ -6111,16 +6114,20 @@
             <p:ph type="ctrTitle"/>
           </p:nvPr>
         </p:nvSpPr>
-        <p:spPr/>
+        <p:spPr>
+          <a:xfrm>
+            <a:off x="1154954" y="1447800"/>
+            <a:ext cx="7363404" cy="3329581"/>
+          </a:xfrm>
+        </p:spPr>
         <p:txBody>
           <a:bodyPr/>
           <a:lstStyle/>
           <a:p>
             <a:r>
-              <a:rPr lang="en-GB" dirty="0" smtClean="0"/>
+              <a:rPr lang="en-GB" dirty="0"/>
               <a:t>Solo Project: 1337 Library</a:t>
             </a:r>
-            <a:endParaRPr lang="en-GB" dirty="0"/>
           </a:p>
         </p:txBody>
       </p:sp>
@@ -6140,10 +6147,9 @@
           <a:lstStyle/>
           <a:p>
             <a:r>
-              <a:rPr lang="en-GB" dirty="0" smtClean="0"/>
+              <a:rPr lang="en-GB" dirty="0"/>
               <a:t>Week 8 Submission</a:t>
             </a:r>
-            <a:endParaRPr lang="en-GB" dirty="0"/>
           </a:p>
         </p:txBody>
       </p:sp>
@@ -6193,36 +6199,51 @@
           <a:lstStyle/>
           <a:p>
             <a:r>
-              <a:rPr lang="en-GB" dirty="0" smtClean="0"/>
-              <a:t>Jenkins</a:t>
-            </a:r>
-            <a:endParaRPr lang="en-GB" dirty="0"/>
-          </a:p>
-        </p:txBody>
-      </p:sp>
-      <p:sp>
-        <p:nvSpPr>
-          <p:cNvPr id="3" name="Content Placeholder 2"/>
-          <p:cNvSpPr>
-            <a:spLocks noGrp="1"/>
-          </p:cNvSpPr>
+              <a:rPr lang="en-GB" dirty="0"/>
+              <a:t>DevOps and CI Pipeline</a:t>
+            </a:r>
+          </a:p>
+        </p:txBody>
+      </p:sp>
+      <p:pic>
+        <p:nvPicPr>
+          <p:cNvPr id="5" name="Content Placeholder 4" descr="A picture containing parking, city, street, meter&#10;&#10;Description automatically generated">
+            <a:extLst>
+              <a:ext uri="{FF2B5EF4-FFF2-40B4-BE49-F238E27FC236}">
+                <a16:creationId xmlns:a16="http://schemas.microsoft.com/office/drawing/2014/main" id="{F2C7CB92-CB67-40A0-925F-08D8EE2611BF}"/>
+              </a:ext>
+            </a:extLst>
+          </p:cNvPr>
+          <p:cNvPicPr>
+            <a:picLocks noGrp="1" noChangeAspect="1"/>
+          </p:cNvPicPr>
           <p:nvPr>
             <p:ph idx="1"/>
           </p:nvPr>
-        </p:nvSpPr>
-        <p:spPr/>
-        <p:txBody>
-          <a:bodyPr/>
-          <a:lstStyle/>
-          <a:p>
-            <a:endParaRPr lang="en-GB"/>
-          </a:p>
-        </p:txBody>
-      </p:sp>
+        </p:nvPicPr>
+        <p:blipFill>
+          <a:blip r:embed="rId2">
+            <a:extLst>
+              <a:ext uri="{28A0092B-C50C-407E-A947-70E740481C1C}">
+                <a14:useLocalDpi xmlns:a14="http://schemas.microsoft.com/office/drawing/2010/main" val="0"/>
+              </a:ext>
+            </a:extLst>
+          </a:blip>
+          <a:stretch>
+            <a:fillRect/>
+          </a:stretch>
+        </p:blipFill>
+        <p:spPr>
+          <a:xfrm>
+            <a:off x="2405398" y="1635544"/>
+            <a:ext cx="6401717" cy="4801288"/>
+          </a:xfrm>
+        </p:spPr>
+      </p:pic>
     </p:spTree>
     <p:extLst>
       <p:ext uri="{BB962C8B-B14F-4D97-AF65-F5344CB8AC3E}">
-        <p14:creationId xmlns:p14="http://schemas.microsoft.com/office/powerpoint/2010/main" val="503306828"/>
+        <p14:creationId xmlns:p14="http://schemas.microsoft.com/office/powerpoint/2010/main" val="1123298553"/>
       </p:ext>
     </p:extLst>
   </p:cSld>
@@ -6265,21 +6286,85 @@
           <a:lstStyle/>
           <a:p>
             <a:r>
-              <a:rPr lang="en-GB" dirty="0" smtClean="0"/>
-              <a:t>Summary</a:t>
-            </a:r>
-            <a:endParaRPr lang="en-GB" dirty="0"/>
-          </a:p>
-        </p:txBody>
-      </p:sp>
-      <p:sp>
-        <p:nvSpPr>
-          <p:cNvPr id="3" name="Content Placeholder 2"/>
-          <p:cNvSpPr>
-            <a:spLocks noGrp="1"/>
-          </p:cNvSpPr>
+              <a:rPr lang="en-GB" dirty="0"/>
+              <a:t>Jenkins</a:t>
+            </a:r>
+          </a:p>
+        </p:txBody>
+      </p:sp>
+      <p:pic>
+        <p:nvPicPr>
+          <p:cNvPr id="5" name="Content Placeholder 4" descr="A screenshot of a cell phone&#10;&#10;Description automatically generated">
+            <a:extLst>
+              <a:ext uri="{FF2B5EF4-FFF2-40B4-BE49-F238E27FC236}">
+                <a16:creationId xmlns:a16="http://schemas.microsoft.com/office/drawing/2014/main" id="{DA04E0BB-27A1-4E2E-8CFD-4F63848661AE}"/>
+              </a:ext>
+            </a:extLst>
+          </p:cNvPr>
+          <p:cNvPicPr>
+            <a:picLocks noGrp="1" noChangeAspect="1"/>
+          </p:cNvPicPr>
           <p:nvPr>
             <p:ph idx="1"/>
+          </p:nvPr>
+        </p:nvPicPr>
+        <p:blipFill>
+          <a:blip r:embed="rId2">
+            <a:extLst>
+              <a:ext uri="{28A0092B-C50C-407E-A947-70E740481C1C}">
+                <a14:useLocalDpi xmlns:a14="http://schemas.microsoft.com/office/drawing/2010/main" val="0"/>
+              </a:ext>
+            </a:extLst>
+          </a:blip>
+          <a:stretch>
+            <a:fillRect/>
+          </a:stretch>
+        </p:blipFill>
+        <p:spPr>
+          <a:xfrm>
+            <a:off x="1658675" y="1283368"/>
+            <a:ext cx="7999548" cy="5121914"/>
+          </a:xfrm>
+        </p:spPr>
+      </p:pic>
+    </p:spTree>
+    <p:extLst>
+      <p:ext uri="{BB962C8B-B14F-4D97-AF65-F5344CB8AC3E}">
+        <p14:creationId xmlns:p14="http://schemas.microsoft.com/office/powerpoint/2010/main" val="503306828"/>
+      </p:ext>
+    </p:extLst>
+  </p:cSld>
+  <p:clrMapOvr>
+    <a:masterClrMapping/>
+  </p:clrMapOvr>
+</p:sld>
+</file>
+
+<file path=ppt/slides/slide12.xml><?xml version="1.0" encoding="utf-8"?>
+<p:sld xmlns:a="http://schemas.openxmlformats.org/drawingml/2006/main" xmlns:r="http://schemas.openxmlformats.org/officeDocument/2006/relationships" xmlns:p="http://schemas.openxmlformats.org/presentationml/2006/main">
+  <p:cSld>
+    <p:spTree>
+      <p:nvGrpSpPr>
+        <p:cNvPr id="1" name=""/>
+        <p:cNvGrpSpPr/>
+        <p:nvPr/>
+      </p:nvGrpSpPr>
+      <p:grpSpPr>
+        <a:xfrm>
+          <a:off x="0" y="0"/>
+          <a:ext cx="0" cy="0"/>
+          <a:chOff x="0" y="0"/>
+          <a:chExt cx="0" cy="0"/>
+        </a:xfrm>
+      </p:grpSpPr>
+      <p:sp>
+        <p:nvSpPr>
+          <p:cNvPr id="2" name="Title 1"/>
+          <p:cNvSpPr>
+            <a:spLocks noGrp="1"/>
+          </p:cNvSpPr>
+          <p:nvPr>
+            <p:ph type="title"/>
           </p:nvPr>
         </p:nvSpPr>
         <p:spPr/>
@@ -6287,7 +6372,362 @@
           <a:bodyPr/>
           <a:lstStyle/>
           <a:p>
-            <a:endParaRPr lang="en-GB"/>
+            <a:r>
+              <a:rPr lang="en-GB" dirty="0"/>
+              <a:t>Summary</a:t>
+            </a:r>
+          </a:p>
+        </p:txBody>
+      </p:sp>
+      <p:sp>
+        <p:nvSpPr>
+          <p:cNvPr id="3" name="Content Placeholder 2"/>
+          <p:cNvSpPr>
+            <a:spLocks noGrp="1"/>
+          </p:cNvSpPr>
+          <p:nvPr>
+            <p:ph idx="1"/>
+          </p:nvPr>
+        </p:nvSpPr>
+        <p:spPr>
+          <a:xfrm>
+            <a:off x="1103313" y="2052919"/>
+            <a:ext cx="4046204" cy="3850576"/>
+          </a:xfrm>
+        </p:spPr>
+        <p:txBody>
+          <a:bodyPr>
+            <a:normAutofit lnSpcReduction="10000"/>
+          </a:bodyPr>
+          <a:lstStyle/>
+          <a:p>
+            <a:pPr marL="0" indent="0">
+              <a:buNone/>
+            </a:pPr>
+            <a:r>
+              <a:rPr lang="en-GB" sz="2400" b="1" u="sng" dirty="0"/>
+              <a:t>What went well:</a:t>
+            </a:r>
+          </a:p>
+          <a:p>
+            <a:r>
+              <a:rPr lang="en-GB" dirty="0"/>
+              <a:t>Successfully created a database with 2 tables that contained CRUD functionality</a:t>
+            </a:r>
+          </a:p>
+          <a:p>
+            <a:r>
+              <a:rPr lang="en-GB" dirty="0"/>
+              <a:t>100% code coverage with tests</a:t>
+            </a:r>
+          </a:p>
+          <a:p>
+            <a:r>
+              <a:rPr lang="en-GB" dirty="0"/>
+              <a:t>Use of Jenkins as a CI Pipeline</a:t>
+            </a:r>
+          </a:p>
+          <a:p>
+            <a:r>
+              <a:rPr lang="en-GB" dirty="0"/>
+              <a:t>Use of Feature Branches in VCS</a:t>
+            </a:r>
+          </a:p>
+        </p:txBody>
+      </p:sp>
+      <p:sp>
+        <p:nvSpPr>
+          <p:cNvPr id="4" name="Content Placeholder 2">
+            <a:extLst>
+              <a:ext uri="{FF2B5EF4-FFF2-40B4-BE49-F238E27FC236}">
+                <a16:creationId xmlns:a16="http://schemas.microsoft.com/office/drawing/2014/main" id="{19ECDE60-0029-47BA-BA20-741FEC9F8DAE}"/>
+              </a:ext>
+            </a:extLst>
+          </p:cNvPr>
+          <p:cNvSpPr txBox="1">
+            <a:spLocks/>
+          </p:cNvSpPr>
+          <p:nvPr/>
+        </p:nvSpPr>
+        <p:spPr>
+          <a:xfrm>
+            <a:off x="6004630" y="2052918"/>
+            <a:ext cx="4046204" cy="3850575"/>
+          </a:xfrm>
+          <a:prstGeom prst="rect">
+            <a:avLst/>
+          </a:prstGeom>
+        </p:spPr>
+        <p:txBody>
+          <a:bodyPr vert="horz" lIns="91440" tIns="45720" rIns="91440" bIns="45720" rtlCol="0">
+            <a:normAutofit/>
+          </a:bodyPr>
+          <a:lstStyle>
+            <a:lvl1pPr marL="342900" indent="-342900" algn="l" defTabSz="457200" rtl="0" eaLnBrk="1" latinLnBrk="0" hangingPunct="1">
+              <a:spcBef>
+                <a:spcPts val="1000"/>
+              </a:spcBef>
+              <a:spcAft>
+                <a:spcPts val="0"/>
+              </a:spcAft>
+              <a:buClr>
+                <a:schemeClr val="bg2">
+                  <a:lumMod val="40000"/>
+                  <a:lumOff val="60000"/>
+                </a:schemeClr>
+              </a:buClr>
+              <a:buSzPct val="80000"/>
+              <a:buFont typeface="Wingdings 3" charset="2"/>
+              <a:buChar char=""/>
+              <a:defRPr sz="2000" b="0" i="0" kern="1200">
+                <a:solidFill>
+                  <a:schemeClr val="tx1"/>
+                </a:solidFill>
+                <a:latin typeface="+mj-lt"/>
+                <a:ea typeface="+mj-ea"/>
+                <a:cs typeface="+mj-cs"/>
+              </a:defRPr>
+            </a:lvl1pPr>
+            <a:lvl2pPr marL="742950" indent="-285750" algn="l" defTabSz="457200" rtl="0" eaLnBrk="1" latinLnBrk="0" hangingPunct="1">
+              <a:spcBef>
+                <a:spcPts val="1000"/>
+              </a:spcBef>
+              <a:spcAft>
+                <a:spcPts val="0"/>
+              </a:spcAft>
+              <a:buClr>
+                <a:schemeClr val="bg2">
+                  <a:lumMod val="40000"/>
+                  <a:lumOff val="60000"/>
+                </a:schemeClr>
+              </a:buClr>
+              <a:buSzPct val="80000"/>
+              <a:buFont typeface="Wingdings 3" charset="2"/>
+              <a:buChar char=""/>
+              <a:defRPr sz="1800" b="0" i="0" kern="1200">
+                <a:solidFill>
+                  <a:schemeClr val="tx1"/>
+                </a:solidFill>
+                <a:latin typeface="+mj-lt"/>
+                <a:ea typeface="+mj-ea"/>
+                <a:cs typeface="+mj-cs"/>
+              </a:defRPr>
+            </a:lvl2pPr>
+            <a:lvl3pPr marL="1143000" indent="-228600" algn="l" defTabSz="457200" rtl="0" eaLnBrk="1" latinLnBrk="0" hangingPunct="1">
+              <a:spcBef>
+                <a:spcPts val="1000"/>
+              </a:spcBef>
+              <a:spcAft>
+                <a:spcPts val="0"/>
+              </a:spcAft>
+              <a:buClr>
+                <a:schemeClr val="bg2">
+                  <a:lumMod val="40000"/>
+                  <a:lumOff val="60000"/>
+                </a:schemeClr>
+              </a:buClr>
+              <a:buSzPct val="80000"/>
+              <a:buFont typeface="Wingdings 3" charset="2"/>
+              <a:buChar char=""/>
+              <a:defRPr sz="1600" b="0" i="0" kern="1200">
+                <a:solidFill>
+                  <a:schemeClr val="tx1"/>
+                </a:solidFill>
+                <a:latin typeface="+mj-lt"/>
+                <a:ea typeface="+mj-ea"/>
+                <a:cs typeface="+mj-cs"/>
+              </a:defRPr>
+            </a:lvl3pPr>
+            <a:lvl4pPr marL="1600200" indent="-228600" algn="l" defTabSz="457200" rtl="0" eaLnBrk="1" latinLnBrk="0" hangingPunct="1">
+              <a:spcBef>
+                <a:spcPts val="1000"/>
+              </a:spcBef>
+              <a:spcAft>
+                <a:spcPts val="0"/>
+              </a:spcAft>
+              <a:buClr>
+                <a:schemeClr val="bg2">
+                  <a:lumMod val="40000"/>
+                  <a:lumOff val="60000"/>
+                </a:schemeClr>
+              </a:buClr>
+              <a:buSzPct val="80000"/>
+              <a:buFont typeface="Wingdings 3" charset="2"/>
+              <a:buChar char=""/>
+              <a:defRPr sz="1400" b="0" i="0" kern="1200">
+                <a:solidFill>
+                  <a:schemeClr val="tx1"/>
+                </a:solidFill>
+                <a:latin typeface="+mj-lt"/>
+                <a:ea typeface="+mj-ea"/>
+                <a:cs typeface="+mj-cs"/>
+              </a:defRPr>
+            </a:lvl4pPr>
+            <a:lvl5pPr marL="2057400" indent="-228600" algn="l" defTabSz="457200" rtl="0" eaLnBrk="1" latinLnBrk="0" hangingPunct="1">
+              <a:spcBef>
+                <a:spcPts val="1000"/>
+              </a:spcBef>
+              <a:spcAft>
+                <a:spcPts val="0"/>
+              </a:spcAft>
+              <a:buClr>
+                <a:schemeClr val="bg2">
+                  <a:lumMod val="40000"/>
+                  <a:lumOff val="60000"/>
+                </a:schemeClr>
+              </a:buClr>
+              <a:buSzPct val="80000"/>
+              <a:buFont typeface="Wingdings 3" charset="2"/>
+              <a:buChar char=""/>
+              <a:defRPr sz="1400" b="0" i="0" kern="1200">
+                <a:solidFill>
+                  <a:schemeClr val="tx1"/>
+                </a:solidFill>
+                <a:latin typeface="+mj-lt"/>
+                <a:ea typeface="+mj-ea"/>
+                <a:cs typeface="+mj-cs"/>
+              </a:defRPr>
+            </a:lvl5pPr>
+            <a:lvl6pPr marL="2506000" indent="-228600" algn="l" defTabSz="457200" rtl="0" eaLnBrk="1" latinLnBrk="0" hangingPunct="1">
+              <a:spcBef>
+                <a:spcPts val="1000"/>
+              </a:spcBef>
+              <a:spcAft>
+                <a:spcPts val="0"/>
+              </a:spcAft>
+              <a:buClr>
+                <a:schemeClr val="bg2">
+                  <a:lumMod val="40000"/>
+                  <a:lumOff val="60000"/>
+                </a:schemeClr>
+              </a:buClr>
+              <a:buSzPct val="80000"/>
+              <a:buFont typeface="Wingdings 3" charset="2"/>
+              <a:buChar char=""/>
+              <a:defRPr sz="1400" b="0" i="0" kern="1200">
+                <a:solidFill>
+                  <a:schemeClr val="tx1"/>
+                </a:solidFill>
+                <a:latin typeface="+mj-lt"/>
+                <a:ea typeface="+mj-ea"/>
+                <a:cs typeface="+mj-cs"/>
+              </a:defRPr>
+            </a:lvl6pPr>
+            <a:lvl7pPr marL="2971800" indent="-228600" algn="l" defTabSz="457200" rtl="0" eaLnBrk="1" latinLnBrk="0" hangingPunct="1">
+              <a:spcBef>
+                <a:spcPts val="1000"/>
+              </a:spcBef>
+              <a:spcAft>
+                <a:spcPts val="0"/>
+              </a:spcAft>
+              <a:buClr>
+                <a:schemeClr val="bg2">
+                  <a:lumMod val="40000"/>
+                  <a:lumOff val="60000"/>
+                </a:schemeClr>
+              </a:buClr>
+              <a:buSzPct val="80000"/>
+              <a:buFont typeface="Wingdings 3" charset="2"/>
+              <a:buChar char=""/>
+              <a:defRPr sz="1400" b="0" i="0" kern="1200">
+                <a:solidFill>
+                  <a:schemeClr val="tx1"/>
+                </a:solidFill>
+                <a:latin typeface="+mj-lt"/>
+                <a:ea typeface="+mj-ea"/>
+                <a:cs typeface="+mj-cs"/>
+              </a:defRPr>
+            </a:lvl7pPr>
+            <a:lvl8pPr marL="3429000" indent="-228600" algn="l" defTabSz="457200" rtl="0" eaLnBrk="1" latinLnBrk="0" hangingPunct="1">
+              <a:spcBef>
+                <a:spcPts val="1000"/>
+              </a:spcBef>
+              <a:spcAft>
+                <a:spcPts val="0"/>
+              </a:spcAft>
+              <a:buClr>
+                <a:schemeClr val="bg2">
+                  <a:lumMod val="40000"/>
+                  <a:lumOff val="60000"/>
+                </a:schemeClr>
+              </a:buClr>
+              <a:buSzPct val="80000"/>
+              <a:buFont typeface="Wingdings 3" charset="2"/>
+              <a:buChar char=""/>
+              <a:defRPr sz="1400" b="0" i="0" kern="1200">
+                <a:solidFill>
+                  <a:schemeClr val="tx1"/>
+                </a:solidFill>
+                <a:latin typeface="+mj-lt"/>
+                <a:ea typeface="+mj-ea"/>
+                <a:cs typeface="+mj-cs"/>
+              </a:defRPr>
+            </a:lvl8pPr>
+            <a:lvl9pPr marL="3886200" indent="-228600" algn="l" defTabSz="457200" rtl="0" eaLnBrk="1" latinLnBrk="0" hangingPunct="1">
+              <a:spcBef>
+                <a:spcPts val="1000"/>
+              </a:spcBef>
+              <a:spcAft>
+                <a:spcPts val="0"/>
+              </a:spcAft>
+              <a:buClr>
+                <a:schemeClr val="bg2">
+                  <a:lumMod val="40000"/>
+                  <a:lumOff val="60000"/>
+                </a:schemeClr>
+              </a:buClr>
+              <a:buSzPct val="80000"/>
+              <a:buFont typeface="Wingdings 3" charset="2"/>
+              <a:buChar char=""/>
+              <a:defRPr sz="1400" b="0" i="0" kern="1200">
+                <a:solidFill>
+                  <a:schemeClr val="tx1"/>
+                </a:solidFill>
+                <a:latin typeface="+mj-lt"/>
+                <a:ea typeface="+mj-ea"/>
+                <a:cs typeface="+mj-cs"/>
+              </a:defRPr>
+            </a:lvl9pPr>
+          </a:lstStyle>
+          <a:p>
+            <a:pPr marL="0" indent="0">
+              <a:buFont typeface="Wingdings 3" charset="2"/>
+              <a:buNone/>
+            </a:pPr>
+            <a:r>
+              <a:rPr lang="en-GB" sz="2400" b="1" u="sng" dirty="0"/>
+              <a:t>Future Improvements:</a:t>
+            </a:r>
+          </a:p>
+          <a:p>
+            <a:r>
+              <a:rPr lang="en-GB" dirty="0"/>
+              <a:t>Make the database relational</a:t>
+            </a:r>
+          </a:p>
+          <a:p>
+            <a:r>
+              <a:rPr lang="en-GB" dirty="0"/>
+              <a:t>Make use of Docker</a:t>
+            </a:r>
+          </a:p>
+          <a:p>
+            <a:r>
+              <a:rPr lang="en-GB" dirty="0"/>
+              <a:t>Use project tracking more frequently</a:t>
+            </a:r>
+          </a:p>
+          <a:p>
+            <a:r>
+              <a:rPr lang="en-GB" dirty="0"/>
+              <a:t>User Interface can be improved</a:t>
+            </a:r>
+          </a:p>
+          <a:p>
+            <a:endParaRPr lang="en-GB" dirty="0"/>
+          </a:p>
+          <a:p>
+            <a:endParaRPr lang="en-GB" dirty="0"/>
           </a:p>
         </p:txBody>
       </p:sp>
@@ -6295,6 +6735,158 @@
     <p:extLst>
       <p:ext uri="{BB962C8B-B14F-4D97-AF65-F5344CB8AC3E}">
         <p14:creationId xmlns:p14="http://schemas.microsoft.com/office/powerpoint/2010/main" val="969438099"/>
+      </p:ext>
+    </p:extLst>
+  </p:cSld>
+  <p:clrMapOvr>
+    <a:masterClrMapping/>
+  </p:clrMapOvr>
+</p:sld>
+</file>
+
+<file path=ppt/slides/slide13.xml><?xml version="1.0" encoding="utf-8"?>
+<p:sld xmlns:a="http://schemas.openxmlformats.org/drawingml/2006/main" xmlns:r="http://schemas.openxmlformats.org/officeDocument/2006/relationships" xmlns:p="http://schemas.openxmlformats.org/presentationml/2006/main">
+  <p:cSld>
+    <p:spTree>
+      <p:nvGrpSpPr>
+        <p:cNvPr id="1" name=""/>
+        <p:cNvGrpSpPr/>
+        <p:nvPr/>
+      </p:nvGrpSpPr>
+      <p:grpSpPr>
+        <a:xfrm>
+          <a:off x="0" y="0"/>
+          <a:ext cx="0" cy="0"/>
+          <a:chOff x="0" y="0"/>
+          <a:chExt cx="0" cy="0"/>
+        </a:xfrm>
+      </p:grpSpPr>
+      <p:sp>
+        <p:nvSpPr>
+          <p:cNvPr id="2" name="Title 1">
+            <a:extLst>
+              <a:ext uri="{FF2B5EF4-FFF2-40B4-BE49-F238E27FC236}">
+                <a16:creationId xmlns:a16="http://schemas.microsoft.com/office/drawing/2014/main" id="{3B38603D-26B3-4118-A25B-4664B242843C}"/>
+              </a:ext>
+            </a:extLst>
+          </p:cNvPr>
+          <p:cNvSpPr>
+            <a:spLocks noGrp="1"/>
+          </p:cNvSpPr>
+          <p:nvPr>
+            <p:ph type="title"/>
+          </p:nvPr>
+        </p:nvSpPr>
+        <p:spPr/>
+        <p:txBody>
+          <a:bodyPr/>
+          <a:lstStyle/>
+          <a:p>
+            <a:r>
+              <a:rPr lang="en-GB" dirty="0"/>
+              <a:t>Demo</a:t>
+            </a:r>
+          </a:p>
+        </p:txBody>
+      </p:sp>
+      <p:sp>
+        <p:nvSpPr>
+          <p:cNvPr id="3" name="Content Placeholder 2">
+            <a:extLst>
+              <a:ext uri="{FF2B5EF4-FFF2-40B4-BE49-F238E27FC236}">
+                <a16:creationId xmlns:a16="http://schemas.microsoft.com/office/drawing/2014/main" id="{7CD37200-06D5-474E-AF28-FD57FE27042B}"/>
+              </a:ext>
+            </a:extLst>
+          </p:cNvPr>
+          <p:cNvSpPr>
+            <a:spLocks noGrp="1"/>
+          </p:cNvSpPr>
+          <p:nvPr>
+            <p:ph idx="1"/>
+          </p:nvPr>
+        </p:nvSpPr>
+        <p:spPr/>
+        <p:txBody>
+          <a:bodyPr/>
+          <a:lstStyle/>
+          <a:p>
+            <a:r>
+              <a:rPr lang="en-GB" dirty="0">
+                <a:hlinkClick r:id="rId2"/>
+              </a:rPr>
+              <a:t>Click Here</a:t>
+            </a:r>
+            <a:endParaRPr lang="en-GB" dirty="0"/>
+          </a:p>
+        </p:txBody>
+      </p:sp>
+    </p:spTree>
+    <p:extLst>
+      <p:ext uri="{BB962C8B-B14F-4D97-AF65-F5344CB8AC3E}">
+        <p14:creationId xmlns:p14="http://schemas.microsoft.com/office/powerpoint/2010/main" val="1618401258"/>
+      </p:ext>
+    </p:extLst>
+  </p:cSld>
+  <p:clrMapOvr>
+    <a:masterClrMapping/>
+  </p:clrMapOvr>
+</p:sld>
+</file>
+
+<file path=ppt/slides/slide14.xml><?xml version="1.0" encoding="utf-8"?>
+<p:sld xmlns:a="http://schemas.openxmlformats.org/drawingml/2006/main" xmlns:r="http://schemas.openxmlformats.org/officeDocument/2006/relationships" xmlns:p="http://schemas.openxmlformats.org/presentationml/2006/main">
+  <p:cSld>
+    <p:spTree>
+      <p:nvGrpSpPr>
+        <p:cNvPr id="1" name=""/>
+        <p:cNvGrpSpPr/>
+        <p:nvPr/>
+      </p:nvGrpSpPr>
+      <p:grpSpPr>
+        <a:xfrm>
+          <a:off x="0" y="0"/>
+          <a:ext cx="0" cy="0"/>
+          <a:chOff x="0" y="0"/>
+          <a:chExt cx="0" cy="0"/>
+        </a:xfrm>
+      </p:grpSpPr>
+      <p:sp>
+        <p:nvSpPr>
+          <p:cNvPr id="2" name="Title 1">
+            <a:extLst>
+              <a:ext uri="{FF2B5EF4-FFF2-40B4-BE49-F238E27FC236}">
+                <a16:creationId xmlns:a16="http://schemas.microsoft.com/office/drawing/2014/main" id="{A761DBE7-BD9B-428B-8C7C-4311904C692A}"/>
+              </a:ext>
+            </a:extLst>
+          </p:cNvPr>
+          <p:cNvSpPr>
+            <a:spLocks noGrp="1"/>
+          </p:cNvSpPr>
+          <p:nvPr>
+            <p:ph type="title"/>
+          </p:nvPr>
+        </p:nvSpPr>
+        <p:spPr>
+          <a:xfrm>
+            <a:off x="3822448" y="3131750"/>
+            <a:ext cx="9404723" cy="1400530"/>
+          </a:xfrm>
+        </p:spPr>
+        <p:txBody>
+          <a:bodyPr/>
+          <a:lstStyle/>
+          <a:p>
+            <a:r>
+              <a:rPr lang="en-GB" sz="6000" b="1" dirty="0"/>
+              <a:t>Questions?</a:t>
+            </a:r>
+          </a:p>
+        </p:txBody>
+      </p:sp>
+    </p:spTree>
+    <p:extLst>
+      <p:ext uri="{BB962C8B-B14F-4D97-AF65-F5344CB8AC3E}">
+        <p14:creationId xmlns:p14="http://schemas.microsoft.com/office/powerpoint/2010/main" val="3450075664"/>
       </p:ext>
     </p:extLst>
   </p:cSld>
@@ -6337,10 +6929,9 @@
           <a:lstStyle/>
           <a:p>
             <a:r>
-              <a:rPr lang="en-GB" dirty="0" smtClean="0"/>
+              <a:rPr lang="en-GB" dirty="0"/>
               <a:t>Brief</a:t>
             </a:r>
-            <a:endParaRPr lang="en-GB" dirty="0"/>
           </a:p>
         </p:txBody>
       </p:sp>
@@ -6356,29 +6947,31 @@
         </p:nvSpPr>
         <p:spPr/>
         <p:txBody>
-          <a:bodyPr/>
+          <a:bodyPr>
+            <a:normAutofit/>
+          </a:bodyPr>
           <a:lstStyle/>
           <a:p>
             <a:r>
-              <a:rPr lang="en-GB" dirty="0" smtClean="0"/>
+              <a:rPr lang="en-GB" sz="2800" dirty="0"/>
               <a:t>2 tables</a:t>
             </a:r>
           </a:p>
           <a:p>
             <a:r>
-              <a:rPr lang="en-GB" dirty="0" smtClean="0"/>
+              <a:rPr lang="en-GB" sz="2800" dirty="0"/>
               <a:t>Full CRUD functionality</a:t>
             </a:r>
           </a:p>
           <a:p>
             <a:r>
-              <a:rPr lang="en-GB" dirty="0" smtClean="0"/>
+              <a:rPr lang="en-GB" sz="2800" dirty="0"/>
               <a:t>Utilize OOP principles</a:t>
             </a:r>
           </a:p>
           <a:p>
             <a:r>
-              <a:rPr lang="en-GB" dirty="0" smtClean="0"/>
+              <a:rPr lang="en-GB" sz="2800" dirty="0"/>
               <a:t>Test thoroughly</a:t>
             </a:r>
           </a:p>
@@ -6430,10 +7023,9 @@
           <a:lstStyle/>
           <a:p>
             <a:r>
-              <a:rPr lang="en-GB" dirty="0" smtClean="0"/>
+              <a:rPr lang="en-GB" dirty="0"/>
               <a:t>The Solution</a:t>
             </a:r>
-            <a:endParaRPr lang="en-GB" dirty="0"/>
           </a:p>
         </p:txBody>
       </p:sp>
@@ -6449,17 +7041,19 @@
         </p:nvSpPr>
         <p:spPr/>
         <p:txBody>
-          <a:bodyPr/>
+          <a:bodyPr>
+            <a:normAutofit/>
+          </a:bodyPr>
           <a:lstStyle/>
           <a:p>
             <a:r>
-              <a:rPr lang="en-GB" dirty="0" smtClean="0"/>
+              <a:rPr lang="en-GB" sz="2800" dirty="0"/>
               <a:t>Create a website that acted as a game library</a:t>
             </a:r>
           </a:p>
           <a:p>
             <a:r>
-              <a:rPr lang="en-GB" dirty="0" smtClean="0"/>
+              <a:rPr lang="en-GB" sz="2800" dirty="0"/>
               <a:t>1 table for games, 1 table for publishers</a:t>
             </a:r>
           </a:p>
@@ -6511,32 +7105,47 @@
           <a:lstStyle/>
           <a:p>
             <a:r>
-              <a:rPr lang="en-GB" dirty="0" smtClean="0"/>
+              <a:rPr lang="en-GB" dirty="0"/>
               <a:t>The Solution – ER Diagrams</a:t>
             </a:r>
-            <a:endParaRPr lang="en-GB" dirty="0"/>
-          </a:p>
-        </p:txBody>
-      </p:sp>
-      <p:sp>
-        <p:nvSpPr>
-          <p:cNvPr id="3" name="Content Placeholder 2"/>
-          <p:cNvSpPr>
-            <a:spLocks noGrp="1"/>
-          </p:cNvSpPr>
+          </a:p>
+        </p:txBody>
+      </p:sp>
+      <p:pic>
+        <p:nvPicPr>
+          <p:cNvPr id="5" name="Content Placeholder 4" descr="A screenshot of text&#10;&#10;Description automatically generated">
+            <a:extLst>
+              <a:ext uri="{FF2B5EF4-FFF2-40B4-BE49-F238E27FC236}">
+                <a16:creationId xmlns:a16="http://schemas.microsoft.com/office/drawing/2014/main" id="{0F9C19EE-762B-47F4-AC19-2D6821B10775}"/>
+              </a:ext>
+            </a:extLst>
+          </p:cNvPr>
+          <p:cNvPicPr>
+            <a:picLocks noGrp="1" noChangeAspect="1"/>
+          </p:cNvPicPr>
           <p:nvPr>
             <p:ph idx="1"/>
           </p:nvPr>
-        </p:nvSpPr>
-        <p:spPr/>
-        <p:txBody>
-          <a:bodyPr/>
-          <a:lstStyle/>
-          <a:p>
-            <a:endParaRPr lang="en-GB"/>
-          </a:p>
-        </p:txBody>
-      </p:sp>
+        </p:nvPicPr>
+        <p:blipFill>
+          <a:blip r:embed="rId2">
+            <a:extLst>
+              <a:ext uri="{28A0092B-C50C-407E-A947-70E740481C1C}">
+                <a14:useLocalDpi xmlns:a14="http://schemas.microsoft.com/office/drawing/2010/main" val="0"/>
+              </a:ext>
+            </a:extLst>
+          </a:blip>
+          <a:stretch>
+            <a:fillRect/>
+          </a:stretch>
+        </p:blipFill>
+        <p:spPr>
+          <a:xfrm>
+            <a:off x="1558831" y="2050473"/>
+            <a:ext cx="8492003" cy="3149962"/>
+          </a:xfrm>
+        </p:spPr>
+      </p:pic>
     </p:spTree>
     <p:extLst>
       <p:ext uri="{BB962C8B-B14F-4D97-AF65-F5344CB8AC3E}">
@@ -6583,32 +7192,44 @@
           <a:lstStyle/>
           <a:p>
             <a:r>
-              <a:rPr lang="en-GB" dirty="0" smtClean="0"/>
+              <a:rPr lang="en-GB" dirty="0"/>
               <a:t>Static Testing</a:t>
             </a:r>
-            <a:endParaRPr lang="en-GB" dirty="0"/>
-          </a:p>
-        </p:txBody>
-      </p:sp>
-      <p:sp>
-        <p:nvSpPr>
-          <p:cNvPr id="3" name="Content Placeholder 2"/>
-          <p:cNvSpPr>
-            <a:spLocks noGrp="1"/>
-          </p:cNvSpPr>
+          </a:p>
+        </p:txBody>
+      </p:sp>
+      <p:pic>
+        <p:nvPicPr>
+          <p:cNvPr id="4" name="Content Placeholder 3">
+            <a:extLst>
+              <a:ext uri="{FF2B5EF4-FFF2-40B4-BE49-F238E27FC236}">
+                <a16:creationId xmlns:a16="http://schemas.microsoft.com/office/drawing/2014/main" id="{0419EE77-5088-45DD-9AC6-A0D69191FA1F}"/>
+              </a:ext>
+            </a:extLst>
+          </p:cNvPr>
+          <p:cNvPicPr>
+            <a:picLocks noGrp="1" noChangeAspect="1"/>
+          </p:cNvPicPr>
           <p:nvPr>
             <p:ph idx="1"/>
           </p:nvPr>
-        </p:nvSpPr>
-        <p:spPr/>
-        <p:txBody>
-          <a:bodyPr/>
-          <a:lstStyle/>
-          <a:p>
-            <a:endParaRPr lang="en-GB"/>
-          </a:p>
-        </p:txBody>
-      </p:sp>
+        </p:nvPicPr>
+        <p:blipFill>
+          <a:blip r:embed="rId2"/>
+          <a:stretch>
+            <a:fillRect/>
+          </a:stretch>
+        </p:blipFill>
+        <p:spPr>
+          <a:xfrm>
+            <a:off x="2358189" y="1363579"/>
+            <a:ext cx="7128486" cy="4685431"/>
+          </a:xfrm>
+          <a:prstGeom prst="rect">
+            <a:avLst/>
+          </a:prstGeom>
+        </p:spPr>
+      </p:pic>
     </p:spTree>
     <p:extLst>
       <p:ext uri="{BB962C8B-B14F-4D97-AF65-F5344CB8AC3E}">
@@ -6655,32 +7276,83 @@
           <a:lstStyle/>
           <a:p>
             <a:r>
-              <a:rPr lang="en-GB" dirty="0" smtClean="0"/>
+              <a:rPr lang="en-GB" dirty="0"/>
               <a:t>Dynamic Testing</a:t>
             </a:r>
-            <a:endParaRPr lang="en-GB" dirty="0"/>
-          </a:p>
-        </p:txBody>
-      </p:sp>
-      <p:sp>
-        <p:nvSpPr>
-          <p:cNvPr id="3" name="Content Placeholder 2"/>
-          <p:cNvSpPr>
-            <a:spLocks noGrp="1"/>
-          </p:cNvSpPr>
+          </a:p>
+        </p:txBody>
+      </p:sp>
+      <p:pic>
+        <p:nvPicPr>
+          <p:cNvPr id="5" name="Content Placeholder 4" descr="A screenshot of a computer&#10;&#10;Description automatically generated">
+            <a:extLst>
+              <a:ext uri="{FF2B5EF4-FFF2-40B4-BE49-F238E27FC236}">
+                <a16:creationId xmlns:a16="http://schemas.microsoft.com/office/drawing/2014/main" id="{1D9CECAC-75EE-4EE7-AA56-92DB63F7E0B3}"/>
+              </a:ext>
+            </a:extLst>
+          </p:cNvPr>
+          <p:cNvPicPr>
+            <a:picLocks noGrp="1" noChangeAspect="1"/>
+          </p:cNvPicPr>
           <p:nvPr>
             <p:ph idx="1"/>
           </p:nvPr>
-        </p:nvSpPr>
-        <p:spPr/>
-        <p:txBody>
-          <a:bodyPr/>
-          <a:lstStyle/>
-          <a:p>
-            <a:endParaRPr lang="en-GB"/>
-          </a:p>
-        </p:txBody>
-      </p:sp>
+        </p:nvPicPr>
+        <p:blipFill>
+          <a:blip r:embed="rId2">
+            <a:extLst>
+              <a:ext uri="{28A0092B-C50C-407E-A947-70E740481C1C}">
+                <a14:useLocalDpi xmlns:a14="http://schemas.microsoft.com/office/drawing/2010/main" val="0"/>
+              </a:ext>
+            </a:extLst>
+          </a:blip>
+          <a:stretch>
+            <a:fillRect/>
+          </a:stretch>
+        </p:blipFill>
+        <p:spPr>
+          <a:xfrm>
+            <a:off x="523362" y="1185863"/>
+            <a:ext cx="10184151" cy="5054373"/>
+          </a:xfrm>
+        </p:spPr>
+      </p:pic>
+      <p:pic>
+        <p:nvPicPr>
+          <p:cNvPr id="7" name="Picture 6" descr="A screenshot of a computer&#10;&#10;Description automatically generated">
+            <a:extLst>
+              <a:ext uri="{FF2B5EF4-FFF2-40B4-BE49-F238E27FC236}">
+                <a16:creationId xmlns:a16="http://schemas.microsoft.com/office/drawing/2014/main" id="{4385133E-9171-468A-A83F-2683E68A30B2}"/>
+              </a:ext>
+            </a:extLst>
+          </p:cNvPr>
+          <p:cNvPicPr>
+            <a:picLocks noChangeAspect="1"/>
+          </p:cNvPicPr>
+          <p:nvPr/>
+        </p:nvPicPr>
+        <p:blipFill>
+          <a:blip r:embed="rId3">
+            <a:extLst>
+              <a:ext uri="{28A0092B-C50C-407E-A947-70E740481C1C}">
+                <a14:useLocalDpi xmlns:a14="http://schemas.microsoft.com/office/drawing/2010/main" val="0"/>
+              </a:ext>
+            </a:extLst>
+          </a:blip>
+          <a:stretch>
+            <a:fillRect/>
+          </a:stretch>
+        </p:blipFill>
+        <p:spPr>
+          <a:xfrm>
+            <a:off x="4854844" y="1185863"/>
+            <a:ext cx="6534713" cy="5054373"/>
+          </a:xfrm>
+          <a:prstGeom prst="rect">
+            <a:avLst/>
+          </a:prstGeom>
+        </p:spPr>
+      </p:pic>
     </p:spTree>
     <p:extLst>
       <p:ext uri="{BB962C8B-B14F-4D97-AF65-F5344CB8AC3E}">
@@ -6727,32 +7399,83 @@
           <a:lstStyle/>
           <a:p>
             <a:r>
-              <a:rPr lang="en-GB" dirty="0" smtClean="0"/>
-              <a:t>Front End</a:t>
-            </a:r>
-            <a:endParaRPr lang="en-GB" dirty="0"/>
-          </a:p>
-        </p:txBody>
-      </p:sp>
-      <p:sp>
-        <p:nvSpPr>
-          <p:cNvPr id="3" name="Content Placeholder 2"/>
-          <p:cNvSpPr>
-            <a:spLocks noGrp="1"/>
-          </p:cNvSpPr>
+              <a:rPr lang="en-GB" dirty="0"/>
+              <a:t>Front End - Wireframes</a:t>
+            </a:r>
+          </a:p>
+        </p:txBody>
+      </p:sp>
+      <p:pic>
+        <p:nvPicPr>
+          <p:cNvPr id="5" name="Content Placeholder 4" descr="A screenshot of a cell phone&#10;&#10;Description automatically generated">
+            <a:extLst>
+              <a:ext uri="{FF2B5EF4-FFF2-40B4-BE49-F238E27FC236}">
+                <a16:creationId xmlns:a16="http://schemas.microsoft.com/office/drawing/2014/main" id="{BF5E0BB7-9CDB-4870-AEF1-23E074A9C3FB}"/>
+              </a:ext>
+            </a:extLst>
+          </p:cNvPr>
+          <p:cNvPicPr>
+            <a:picLocks noGrp="1" noChangeAspect="1"/>
+          </p:cNvPicPr>
           <p:nvPr>
             <p:ph idx="1"/>
           </p:nvPr>
-        </p:nvSpPr>
-        <p:spPr/>
-        <p:txBody>
-          <a:bodyPr/>
-          <a:lstStyle/>
-          <a:p>
-            <a:endParaRPr lang="en-GB"/>
-          </a:p>
-        </p:txBody>
-      </p:sp>
+        </p:nvPicPr>
+        <p:blipFill>
+          <a:blip r:embed="rId2">
+            <a:extLst>
+              <a:ext uri="{28A0092B-C50C-407E-A947-70E740481C1C}">
+                <a14:useLocalDpi xmlns:a14="http://schemas.microsoft.com/office/drawing/2010/main" val="0"/>
+              </a:ext>
+            </a:extLst>
+          </a:blip>
+          <a:stretch>
+            <a:fillRect/>
+          </a:stretch>
+        </p:blipFill>
+        <p:spPr>
+          <a:xfrm>
+            <a:off x="646111" y="1638618"/>
+            <a:ext cx="6772275" cy="4010025"/>
+          </a:xfrm>
+        </p:spPr>
+      </p:pic>
+      <p:pic>
+        <p:nvPicPr>
+          <p:cNvPr id="7" name="Picture 6" descr="A screenshot of a cell phone&#10;&#10;Description automatically generated">
+            <a:extLst>
+              <a:ext uri="{FF2B5EF4-FFF2-40B4-BE49-F238E27FC236}">
+                <a16:creationId xmlns:a16="http://schemas.microsoft.com/office/drawing/2014/main" id="{32426A9D-C272-4845-BC2B-33C1D445B054}"/>
+              </a:ext>
+            </a:extLst>
+          </p:cNvPr>
+          <p:cNvPicPr>
+            <a:picLocks noChangeAspect="1"/>
+          </p:cNvPicPr>
+          <p:nvPr/>
+        </p:nvPicPr>
+        <p:blipFill>
+          <a:blip r:embed="rId3">
+            <a:extLst>
+              <a:ext uri="{28A0092B-C50C-407E-A947-70E740481C1C}">
+                <a14:useLocalDpi xmlns:a14="http://schemas.microsoft.com/office/drawing/2010/main" val="0"/>
+              </a:ext>
+            </a:extLst>
+          </a:blip>
+          <a:stretch>
+            <a:fillRect/>
+          </a:stretch>
+        </p:blipFill>
+        <p:spPr>
+          <a:xfrm>
+            <a:off x="6349522" y="1638618"/>
+            <a:ext cx="5343525" cy="4010025"/>
+          </a:xfrm>
+          <a:prstGeom prst="rect">
+            <a:avLst/>
+          </a:prstGeom>
+        </p:spPr>
+      </p:pic>
     </p:spTree>
     <p:extLst>
       <p:ext uri="{BB962C8B-B14F-4D97-AF65-F5344CB8AC3E}">
@@ -6799,32 +7522,47 @@
           <a:lstStyle/>
           <a:p>
             <a:r>
-              <a:rPr lang="en-GB" dirty="0" smtClean="0"/>
+              <a:rPr lang="en-GB" dirty="0"/>
               <a:t>Front End</a:t>
             </a:r>
-            <a:endParaRPr lang="en-GB" dirty="0"/>
-          </a:p>
-        </p:txBody>
-      </p:sp>
-      <p:sp>
-        <p:nvSpPr>
-          <p:cNvPr id="3" name="Content Placeholder 2"/>
-          <p:cNvSpPr>
-            <a:spLocks noGrp="1"/>
-          </p:cNvSpPr>
+          </a:p>
+        </p:txBody>
+      </p:sp>
+      <p:pic>
+        <p:nvPicPr>
+          <p:cNvPr id="7" name="Content Placeholder 6" descr="A screenshot of a cell phone&#10;&#10;Description automatically generated">
+            <a:extLst>
+              <a:ext uri="{FF2B5EF4-FFF2-40B4-BE49-F238E27FC236}">
+                <a16:creationId xmlns:a16="http://schemas.microsoft.com/office/drawing/2014/main" id="{B8F5B5F8-A316-4940-A34E-6808EC049F8A}"/>
+              </a:ext>
+            </a:extLst>
+          </p:cNvPr>
+          <p:cNvPicPr>
+            <a:picLocks noGrp="1" noChangeAspect="1"/>
+          </p:cNvPicPr>
           <p:nvPr>
             <p:ph idx="1"/>
           </p:nvPr>
-        </p:nvSpPr>
-        <p:spPr/>
-        <p:txBody>
-          <a:bodyPr/>
-          <a:lstStyle/>
-          <a:p>
-            <a:endParaRPr lang="en-GB"/>
-          </a:p>
-        </p:txBody>
-      </p:sp>
+        </p:nvPicPr>
+        <p:blipFill>
+          <a:blip r:embed="rId2">
+            <a:extLst>
+              <a:ext uri="{28A0092B-C50C-407E-A947-70E740481C1C}">
+                <a14:useLocalDpi xmlns:a14="http://schemas.microsoft.com/office/drawing/2010/main" val="0"/>
+              </a:ext>
+            </a:extLst>
+          </a:blip>
+          <a:stretch>
+            <a:fillRect/>
+          </a:stretch>
+        </p:blipFill>
+        <p:spPr>
+          <a:xfrm>
+            <a:off x="1295818" y="1853248"/>
+            <a:ext cx="8947150" cy="3935751"/>
+          </a:xfrm>
+        </p:spPr>
+      </p:pic>
     </p:spTree>
     <p:extLst>
       <p:ext uri="{BB962C8B-B14F-4D97-AF65-F5344CB8AC3E}">
@@ -6857,7 +7595,13 @@
       </p:grpSpPr>
       <p:sp>
         <p:nvSpPr>
-          <p:cNvPr id="2" name="Title 1"/>
+          <p:cNvPr id="2" name="Title 1">
+            <a:extLst>
+              <a:ext uri="{FF2B5EF4-FFF2-40B4-BE49-F238E27FC236}">
+                <a16:creationId xmlns:a16="http://schemas.microsoft.com/office/drawing/2014/main" id="{5EAEC566-5E70-432A-A496-B555FE484A2B}"/>
+              </a:ext>
+            </a:extLst>
+          </p:cNvPr>
           <p:cNvSpPr>
             <a:spLocks noGrp="1"/>
           </p:cNvSpPr>
@@ -6871,36 +7615,51 @@
           <a:lstStyle/>
           <a:p>
             <a:r>
-              <a:rPr lang="en-GB" dirty="0" smtClean="0"/>
-              <a:t>DevOps and CI Pipeline</a:t>
-            </a:r>
-            <a:endParaRPr lang="en-GB" dirty="0"/>
-          </a:p>
-        </p:txBody>
-      </p:sp>
-      <p:sp>
-        <p:nvSpPr>
-          <p:cNvPr id="3" name="Content Placeholder 2"/>
-          <p:cNvSpPr>
-            <a:spLocks noGrp="1"/>
-          </p:cNvSpPr>
+              <a:rPr lang="en-GB" dirty="0"/>
+              <a:t>Front End</a:t>
+            </a:r>
+          </a:p>
+        </p:txBody>
+      </p:sp>
+      <p:pic>
+        <p:nvPicPr>
+          <p:cNvPr id="5" name="Content Placeholder 4" descr="A screen shot of a person&#10;&#10;Description automatically generated">
+            <a:extLst>
+              <a:ext uri="{FF2B5EF4-FFF2-40B4-BE49-F238E27FC236}">
+                <a16:creationId xmlns:a16="http://schemas.microsoft.com/office/drawing/2014/main" id="{AE381235-347B-4298-BF79-DA51BF563A7E}"/>
+              </a:ext>
+            </a:extLst>
+          </p:cNvPr>
+          <p:cNvPicPr>
+            <a:picLocks noGrp="1" noChangeAspect="1"/>
+          </p:cNvPicPr>
           <p:nvPr>
             <p:ph idx="1"/>
           </p:nvPr>
-        </p:nvSpPr>
-        <p:spPr/>
-        <p:txBody>
-          <a:bodyPr/>
-          <a:lstStyle/>
-          <a:p>
-            <a:endParaRPr lang="en-GB"/>
-          </a:p>
-        </p:txBody>
-      </p:sp>
+        </p:nvPicPr>
+        <p:blipFill>
+          <a:blip r:embed="rId2">
+            <a:extLst>
+              <a:ext uri="{28A0092B-C50C-407E-A947-70E740481C1C}">
+                <a14:useLocalDpi xmlns:a14="http://schemas.microsoft.com/office/drawing/2010/main" val="0"/>
+              </a:ext>
+            </a:extLst>
+          </a:blip>
+          <a:stretch>
+            <a:fillRect/>
+          </a:stretch>
+        </p:blipFill>
+        <p:spPr>
+          <a:xfrm>
+            <a:off x="190907" y="1989222"/>
+            <a:ext cx="11810186" cy="3513220"/>
+          </a:xfrm>
+        </p:spPr>
+      </p:pic>
     </p:spTree>
     <p:extLst>
       <p:ext uri="{BB962C8B-B14F-4D97-AF65-F5344CB8AC3E}">
-        <p14:creationId xmlns:p14="http://schemas.microsoft.com/office/powerpoint/2010/main" val="1123298553"/>
+        <p14:creationId xmlns:p14="http://schemas.microsoft.com/office/powerpoint/2010/main" val="331743373"/>
       </p:ext>
     </p:extLst>
   </p:cSld>

</xml_diff>